<commit_message>
Uploading QUIC TEXT results (classification reports)
</commit_message>
<xml_diff>
--- a/Research/Research_Progress.pptx
+++ b/Research/Research_Progress.pptx
@@ -17,7 +17,7 @@
     <p:sldId id="312" r:id="rId14"/>
     <p:sldId id="316" r:id="rId15"/>
     <p:sldId id="313" r:id="rId16"/>
-    <p:sldId id="317" r:id="rId17"/>
+    <p:sldId id="318" r:id="rId17"/>
   </p:sldIdLst>
   <p:sldSz cx="12192000" cy="6858000"/>
   <p:notesSz cx="6858000" cy="9144000"/>
@@ -294,7 +294,7 @@
             <a:fld id="{87DE6118-2437-4B30-8E3C-4D2BE6020583}" type="datetimeFigureOut">
               <a:rPr lang="en-US"/>
               <a:pPr/>
-              <a:t>4/11/24</a:t>
+              <a:t>4/13/24</a:t>
             </a:fld>
             <a:endParaRPr lang="en-US" dirty="0"/>
           </a:p>
@@ -620,7 +620,7 @@
           <a:p>
             <a:fld id="{87DE6118-2437-4B30-8E3C-4D2BE6020583}" type="datetimeFigureOut">
               <a:rPr lang="en-US"/>
-              <a:t>4/11/24</a:t>
+              <a:t>4/13/24</a:t>
             </a:fld>
             <a:endParaRPr lang="en-US" dirty="0"/>
           </a:p>
@@ -795,7 +795,7 @@
           <a:p>
             <a:fld id="{87DE6118-2437-4B30-8E3C-4D2BE6020583}" type="datetimeFigureOut">
               <a:rPr lang="en-US"/>
-              <a:t>4/11/24</a:t>
+              <a:t>4/13/24</a:t>
             </a:fld>
             <a:endParaRPr lang="en-US" dirty="0"/>
           </a:p>
@@ -960,7 +960,7 @@
           <a:p>
             <a:fld id="{87DE6118-2437-4B30-8E3C-4D2BE6020583}" type="datetimeFigureOut">
               <a:rPr lang="en-US"/>
-              <a:t>4/11/24</a:t>
+              <a:t>4/13/24</a:t>
             </a:fld>
             <a:endParaRPr lang="en-US" dirty="0"/>
           </a:p>
@@ -1233,7 +1233,7 @@
             <a:fld id="{87DE6118-2437-4B30-8E3C-4D2BE6020583}" type="datetimeFigureOut">
               <a:rPr lang="en-US"/>
               <a:pPr/>
-              <a:t>4/11/24</a:t>
+              <a:t>4/13/24</a:t>
             </a:fld>
             <a:endParaRPr lang="en-US" dirty="0"/>
           </a:p>
@@ -1623,7 +1623,7 @@
           <a:p>
             <a:fld id="{87DE6118-2437-4B30-8E3C-4D2BE6020583}" type="datetimeFigureOut">
               <a:rPr lang="en-US"/>
-              <a:t>4/11/24</a:t>
+              <a:t>4/13/24</a:t>
             </a:fld>
             <a:endParaRPr lang="en-US" dirty="0"/>
           </a:p>
@@ -2095,7 +2095,7 @@
           <a:p>
             <a:fld id="{87DE6118-2437-4B30-8E3C-4D2BE6020583}" type="datetimeFigureOut">
               <a:rPr lang="en-US"/>
-              <a:t>4/11/24</a:t>
+              <a:t>4/13/24</a:t>
             </a:fld>
             <a:endParaRPr lang="en-US" dirty="0"/>
           </a:p>
@@ -2208,7 +2208,7 @@
           <a:p>
             <a:fld id="{87DE6118-2437-4B30-8E3C-4D2BE6020583}" type="datetimeFigureOut">
               <a:rPr lang="en-US"/>
-              <a:t>4/11/24</a:t>
+              <a:t>4/13/24</a:t>
             </a:fld>
             <a:endParaRPr lang="en-US" dirty="0"/>
           </a:p>
@@ -2298,7 +2298,7 @@
           <a:p>
             <a:fld id="{87DE6118-2437-4B30-8E3C-4D2BE6020583}" type="datetimeFigureOut">
               <a:rPr lang="en-US"/>
-              <a:t>4/11/24</a:t>
+              <a:t>4/13/24</a:t>
             </a:fld>
             <a:endParaRPr lang="en-US" dirty="0"/>
           </a:p>
@@ -2640,7 +2640,7 @@
             <a:fld id="{87DE6118-2437-4B30-8E3C-4D2BE6020583}" type="datetimeFigureOut">
               <a:rPr lang="en-US"/>
               <a:pPr/>
-              <a:t>4/11/24</a:t>
+              <a:t>4/13/24</a:t>
             </a:fld>
             <a:endParaRPr lang="en-US" dirty="0"/>
           </a:p>
@@ -3024,7 +3024,7 @@
             <a:fld id="{87DE6118-2437-4B30-8E3C-4D2BE6020583}" type="datetimeFigureOut">
               <a:rPr lang="en-US"/>
               <a:pPr/>
-              <a:t>4/11/24</a:t>
+              <a:t>4/13/24</a:t>
             </a:fld>
             <a:endParaRPr lang="en-US" dirty="0"/>
           </a:p>
@@ -3299,7 +3299,7 @@
             <a:fld id="{87DE6118-2437-4B30-8E3C-4D2BE6020583}" type="datetimeFigureOut">
               <a:rPr lang="en-US"/>
               <a:pPr/>
-              <a:t>4/11/24</a:t>
+              <a:t>4/13/24</a:t>
             </a:fld>
             <a:endParaRPr lang="en-US" dirty="0"/>
           </a:p>
@@ -3990,14 +3990,14 @@
           <p:nvPr>
             <p:extLst>
               <p:ext uri="{D42A27DB-BD31-4B8C-83A1-F6EECF244321}">
-                <p14:modId xmlns:p14="http://schemas.microsoft.com/office/powerpoint/2010/main" val="262967716"/>
+                <p14:modId xmlns:p14="http://schemas.microsoft.com/office/powerpoint/2010/main" val="3584872392"/>
               </p:ext>
             </p:extLst>
           </p:nvPr>
         </p:nvGraphicFramePr>
         <p:xfrm>
-          <a:off x="2871926" y="1169257"/>
-          <a:ext cx="7184766" cy="2775455"/>
+          <a:off x="1938130" y="1331843"/>
+          <a:ext cx="8118558" cy="3571680"/>
         </p:xfrm>
         <a:graphic>
           <a:graphicData uri="http://schemas.openxmlformats.org/drawingml/2006/table">
@@ -4006,42 +4006,49 @@
                 <a:tableStyleId>{5C22544A-7EE6-4342-B048-85BDC9FD1C3A}</a:tableStyleId>
               </a:tblPr>
               <a:tblGrid>
-                <a:gridCol w="1197461">
+                <a:gridCol w="1159794">
                   <a:extLst>
                     <a:ext uri="{9D8B030D-6E8A-4147-A177-3AD203B41FA5}">
                       <a16:colId xmlns:a16="http://schemas.microsoft.com/office/drawing/2014/main" val="3803676094"/>
                     </a:ext>
                   </a:extLst>
                 </a:gridCol>
-                <a:gridCol w="1197461">
+                <a:gridCol w="1159794">
                   <a:extLst>
                     <a:ext uri="{9D8B030D-6E8A-4147-A177-3AD203B41FA5}">
                       <a16:colId xmlns:a16="http://schemas.microsoft.com/office/drawing/2014/main" val="792236167"/>
                     </a:ext>
                   </a:extLst>
                 </a:gridCol>
-                <a:gridCol w="1197461">
+                <a:gridCol w="1159794">
                   <a:extLst>
                     <a:ext uri="{9D8B030D-6E8A-4147-A177-3AD203B41FA5}">
                       <a16:colId xmlns:a16="http://schemas.microsoft.com/office/drawing/2014/main" val="3634636527"/>
                     </a:ext>
                   </a:extLst>
                 </a:gridCol>
-                <a:gridCol w="1197461">
+                <a:gridCol w="1159794">
+                  <a:extLst>
+                    <a:ext uri="{9D8B030D-6E8A-4147-A177-3AD203B41FA5}">
+                      <a16:colId xmlns:a16="http://schemas.microsoft.com/office/drawing/2014/main" val="2608066183"/>
+                    </a:ext>
+                  </a:extLst>
+                </a:gridCol>
+                <a:gridCol w="1159794">
                   <a:extLst>
                     <a:ext uri="{9D8B030D-6E8A-4147-A177-3AD203B41FA5}">
                       <a16:colId xmlns:a16="http://schemas.microsoft.com/office/drawing/2014/main" val="382139967"/>
                     </a:ext>
                   </a:extLst>
                 </a:gridCol>
-                <a:gridCol w="1197461">
+                <a:gridCol w="1159794">
                   <a:extLst>
                     <a:ext uri="{9D8B030D-6E8A-4147-A177-3AD203B41FA5}">
                       <a16:colId xmlns:a16="http://schemas.microsoft.com/office/drawing/2014/main" val="3892969531"/>
                     </a:ext>
                   </a:extLst>
                 </a:gridCol>
-                <a:gridCol w="1197461">
+                <a:gridCol w="1159794">
                   <a:extLst>
                     <a:ext uri="{9D8B030D-6E8A-4147-A177-3AD203B41FA5}">
                       <a16:colId xmlns:a16="http://schemas.microsoft.com/office/drawing/2014/main" val="3453683253"/>
@@ -4049,13 +4056,13 @@
                   </a:extLst>
                 </a:gridCol>
               </a:tblGrid>
-              <a:tr h="499960">
-                <a:tc>
-                  <a:txBody>
-                    <a:bodyPr/>
-                    <a:lstStyle/>
-                    <a:p>
-                      <a:pPr marL="0" algn="r" defTabSz="914400" rtl="1" eaLnBrk="1" latinLnBrk="0" hangingPunct="1"/>
+              <a:tr h="1038029">
+                <a:tc>
+                  <a:txBody>
+                    <a:bodyPr/>
+                    <a:lstStyle/>
+                    <a:p>
+                      <a:pPr marL="0" algn="l" defTabSz="914400" rtl="0" eaLnBrk="1" latinLnBrk="0" hangingPunct="1"/>
                       <a:endParaRPr lang="en-IL" dirty="0"/>
                     </a:p>
                   </a:txBody>
@@ -4087,8 +4094,22 @@
                     <a:p>
                       <a:pPr marL="0" algn="ctr" defTabSz="914400" rtl="0" eaLnBrk="1" latinLnBrk="0" hangingPunct="1"/>
                       <a:r>
-                        <a:rPr lang="en-IL"/>
+                        <a:rPr lang="en-IL" dirty="0"/>
                         <a:t>CNN</a:t>
+                      </a:r>
+                    </a:p>
+                  </a:txBody>
+                  <a:tcPr anchor="ctr"/>
+                </a:tc>
+                <a:tc>
+                  <a:txBody>
+                    <a:bodyPr/>
+                    <a:lstStyle/>
+                    <a:p>
+                      <a:pPr marL="0" algn="ctr" defTabSz="914400" rtl="1" eaLnBrk="1" latinLnBrk="0" hangingPunct="1"/>
+                      <a:r>
+                        <a:rPr lang="en-IL" dirty="0"/>
+                        <a:t>VIT</a:t>
                       </a:r>
                     </a:p>
                   </a:txBody>
@@ -4145,7 +4166,7 @@
                   </a:ext>
                 </a:extLst>
               </a:tr>
-              <a:tr h="377695">
+              <a:tr h="428761">
                 <a:tc>
                   <a:txBody>
                     <a:bodyPr/>
@@ -4184,6 +4205,20 @@
                       <a:r>
                         <a:rPr lang="en-US" dirty="0"/>
                         <a:t>0.934</a:t>
+                      </a:r>
+                    </a:p>
+                  </a:txBody>
+                  <a:tcPr/>
+                </a:tc>
+                <a:tc>
+                  <a:txBody>
+                    <a:bodyPr/>
+                    <a:lstStyle/>
+                    <a:p>
+                      <a:pPr marL="0" algn="ctr" defTabSz="914400" rtl="0" eaLnBrk="1" latinLnBrk="0" hangingPunct="1"/>
+                      <a:r>
+                        <a:rPr lang="en-US" dirty="0"/>
+                        <a:t>0.855</a:t>
                       </a:r>
                     </a:p>
                   </a:txBody>
@@ -4237,7 +4272,7 @@
                   </a:ext>
                 </a:extLst>
               </a:tr>
-              <a:tr h="370840">
+              <a:tr h="420978">
                 <a:tc>
                   <a:txBody>
                     <a:bodyPr/>
@@ -4276,6 +4311,20 @@
                       <a:r>
                         <a:rPr lang="en-IL" dirty="0"/>
                         <a:t>0.933</a:t>
+                      </a:r>
+                    </a:p>
+                  </a:txBody>
+                  <a:tcPr/>
+                </a:tc>
+                <a:tc>
+                  <a:txBody>
+                    <a:bodyPr/>
+                    <a:lstStyle/>
+                    <a:p>
+                      <a:pPr marL="0" algn="ctr" defTabSz="914400" rtl="0" eaLnBrk="1" latinLnBrk="0" hangingPunct="1"/>
+                      <a:r>
+                        <a:rPr lang="en-IL" dirty="0"/>
+                        <a:t>0.841</a:t>
                       </a:r>
                     </a:p>
                   </a:txBody>
@@ -4329,7 +4378,7 @@
                   </a:ext>
                 </a:extLst>
               </a:tr>
-              <a:tr h="370840">
+              <a:tr h="420978">
                 <a:tc>
                   <a:txBody>
                     <a:bodyPr/>
@@ -4340,7 +4389,7 @@
                         <a:rPr lang="he-IL" dirty="0"/>
                         <a:t>3 שניות</a:t>
                       </a:r>
-                      <a:endParaRPr lang="en-IL"/>
+                      <a:endParaRPr lang="en-IL" dirty="0"/>
                     </a:p>
                   </a:txBody>
                   <a:tcPr/>
@@ -4368,6 +4417,20 @@
                       <a:r>
                         <a:rPr lang="en-IL" dirty="0"/>
                         <a:t>0.933</a:t>
+                      </a:r>
+                    </a:p>
+                  </a:txBody>
+                  <a:tcPr/>
+                </a:tc>
+                <a:tc>
+                  <a:txBody>
+                    <a:bodyPr/>
+                    <a:lstStyle/>
+                    <a:p>
+                      <a:pPr marL="0" algn="ctr" defTabSz="914400" rtl="0" eaLnBrk="1" latinLnBrk="0" hangingPunct="1"/>
+                      <a:r>
+                        <a:rPr lang="en-IL" dirty="0"/>
+                        <a:t>0.859</a:t>
                       </a:r>
                     </a:p>
                   </a:txBody>
@@ -4421,7 +4484,122 @@
                   </a:ext>
                 </a:extLst>
               </a:tr>
-              <a:tr h="370840">
+              <a:tr h="420978">
+                <a:tc>
+                  <a:txBody>
+                    <a:bodyPr/>
+                    <a:lstStyle/>
+                    <a:p>
+                      <a:pPr marL="0" algn="ctr" defTabSz="914400" rtl="0" eaLnBrk="1" latinLnBrk="0" hangingPunct="1"/>
+                      <a:r>
+                        <a:rPr lang="he-IL" dirty="0"/>
+                        <a:t>7 שניות</a:t>
+                      </a:r>
+                      <a:r>
+                        <a:rPr lang="en-US" dirty="0"/>
+                        <a:t>.</a:t>
+                      </a:r>
+                      <a:r>
+                        <a:rPr lang="he-IL" dirty="0"/>
+                        <a:t>5</a:t>
+                      </a:r>
+                      <a:endParaRPr lang="en-IL" dirty="0"/>
+                    </a:p>
+                  </a:txBody>
+                  <a:tcPr/>
+                </a:tc>
+                <a:tc>
+                  <a:txBody>
+                    <a:bodyPr/>
+                    <a:lstStyle/>
+                    <a:p>
+                      <a:pPr marL="0" algn="ctr" defTabSz="914400" rtl="0" eaLnBrk="1" latinLnBrk="0" hangingPunct="1"/>
+                      <a:r>
+                        <a:rPr lang="en-IL" dirty="0"/>
+                        <a:t>0.708</a:t>
+                      </a:r>
+                    </a:p>
+                  </a:txBody>
+                  <a:tcPr/>
+                </a:tc>
+                <a:tc>
+                  <a:txBody>
+                    <a:bodyPr/>
+                    <a:lstStyle/>
+                    <a:p>
+                      <a:pPr marL="0" algn="ctr" defTabSz="914400" rtl="0" eaLnBrk="1" latinLnBrk="0" hangingPunct="1"/>
+                      <a:r>
+                        <a:rPr lang="en-IL" dirty="0"/>
+                        <a:t>0.971</a:t>
+                      </a:r>
+                    </a:p>
+                  </a:txBody>
+                  <a:tcPr/>
+                </a:tc>
+                <a:tc>
+                  <a:txBody>
+                    <a:bodyPr/>
+                    <a:lstStyle/>
+                    <a:p>
+                      <a:pPr marL="0" algn="ctr" defTabSz="914400" rtl="0" eaLnBrk="1" latinLnBrk="0" hangingPunct="1"/>
+                      <a:r>
+                        <a:rPr lang="en-US" dirty="0"/>
+                        <a:t>0.850</a:t>
+                      </a:r>
+                      <a:endParaRPr lang="en-IL" dirty="0"/>
+                    </a:p>
+                  </a:txBody>
+                  <a:tcPr/>
+                </a:tc>
+                <a:tc>
+                  <a:txBody>
+                    <a:bodyPr/>
+                    <a:lstStyle/>
+                    <a:p>
+                      <a:pPr marL="0" algn="ctr" defTabSz="914400" rtl="0" eaLnBrk="1" latinLnBrk="0" hangingPunct="1"/>
+                      <a:r>
+                        <a:rPr lang="en-IL" dirty="0"/>
+                        <a:t>183.37</a:t>
+                      </a:r>
+                    </a:p>
+                  </a:txBody>
+                  <a:tcPr/>
+                </a:tc>
+                <a:tc>
+                  <a:txBody>
+                    <a:bodyPr/>
+                    <a:lstStyle/>
+                    <a:p>
+                      <a:pPr marL="0" algn="ctr" defTabSz="914400" rtl="0" eaLnBrk="1" latinLnBrk="0" hangingPunct="1"/>
+                      <a:r>
+                        <a:rPr lang="en-IL" dirty="0"/>
+                        <a:t>1718</a:t>
+                      </a:r>
+                    </a:p>
+                  </a:txBody>
+                  <a:tcPr/>
+                </a:tc>
+                <a:tc>
+                  <a:txBody>
+                    <a:bodyPr/>
+                    <a:lstStyle/>
+                    <a:p>
+                      <a:pPr marL="0" algn="ctr" defTabSz="914400" rtl="0" eaLnBrk="1" latinLnBrk="0" hangingPunct="1"/>
+                      <a:r>
+                        <a:rPr lang="en-IL" dirty="0"/>
+                        <a:t>5</a:t>
+                      </a:r>
+                    </a:p>
+                  </a:txBody>
+                  <a:tcPr/>
+                </a:tc>
+                <a:extLst>
+                  <a:ext uri="{0D108BD9-81ED-4DB2-BD59-A6C34878D82A}">
+                    <a16:rowId xmlns:a16="http://schemas.microsoft.com/office/drawing/2014/main" val="3379687471"/>
+                  </a:ext>
+                </a:extLst>
+              </a:tr>
+              <a:tr h="420978">
                 <a:tc>
                   <a:txBody>
                     <a:bodyPr/>
@@ -4460,6 +4638,20 @@
                       <a:r>
                         <a:rPr lang="en-IL" dirty="0"/>
                         <a:t>0.966</a:t>
+                      </a:r>
+                    </a:p>
+                  </a:txBody>
+                  <a:tcPr/>
+                </a:tc>
+                <a:tc>
+                  <a:txBody>
+                    <a:bodyPr/>
+                    <a:lstStyle/>
+                    <a:p>
+                      <a:pPr algn="ctr"/>
+                      <a:r>
+                        <a:rPr lang="en-IL" dirty="0"/>
+                        <a:t>0.834</a:t>
                       </a:r>
                     </a:p>
                   </a:txBody>
@@ -4513,7 +4705,7 @@
                   </a:ext>
                 </a:extLst>
               </a:tr>
-              <a:tr h="370840">
+              <a:tr h="420978">
                 <a:tc>
                   <a:txBody>
                     <a:bodyPr/>
@@ -4558,6 +4750,20 @@
                         <a:t>89</a:t>
                       </a:r>
                       <a:endParaRPr lang="en-IL" dirty="0"/>
+                    </a:p>
+                  </a:txBody>
+                  <a:tcPr anchor="ctr"/>
+                </a:tc>
+                <a:tc>
+                  <a:txBody>
+                    <a:bodyPr/>
+                    <a:lstStyle/>
+                    <a:p>
+                      <a:pPr algn="ctr"/>
+                      <a:r>
+                        <a:rPr lang="en-IL" dirty="0"/>
+                        <a:t>0.952</a:t>
+                      </a:r>
                     </a:p>
                   </a:txBody>
                   <a:tcPr anchor="ctr"/>
@@ -4663,36 +4869,6 @@
           </a:p>
         </p:txBody>
       </p:sp>
-      <p:pic>
-        <p:nvPicPr>
-          <p:cNvPr id="2" name="Picture 1">
-            <a:extLst>
-              <a:ext uri="{FF2B5EF4-FFF2-40B4-BE49-F238E27FC236}">
-                <a16:creationId xmlns:a16="http://schemas.microsoft.com/office/drawing/2014/main" id="{C9F5F81D-FB0D-AF50-C637-54FE51C73C9F}"/>
-              </a:ext>
-            </a:extLst>
-          </p:cNvPr>
-          <p:cNvPicPr>
-            <a:picLocks noChangeAspect="1"/>
-          </p:cNvPicPr>
-          <p:nvPr/>
-        </p:nvPicPr>
-        <p:blipFill>
-          <a:blip r:embed="rId2"/>
-          <a:stretch>
-            <a:fillRect/>
-          </a:stretch>
-        </p:blipFill>
-        <p:spPr>
-          <a:xfrm>
-            <a:off x="4298950" y="4027410"/>
-            <a:ext cx="3594100" cy="2743200"/>
-          </a:xfrm>
-          <a:prstGeom prst="rect">
-            <a:avLst/>
-          </a:prstGeom>
-        </p:spPr>
-      </p:pic>
     </p:spTree>
     <p:extLst>
       <p:ext uri="{BB962C8B-B14F-4D97-AF65-F5344CB8AC3E}">
@@ -5168,7 +5344,7 @@
               <a:t>epoch</a:t>
             </a:r>
             <a:r>
-              <a:rPr lang="he-IL"/>
+              <a:rPr lang="he-IL" dirty="0"/>
               <a:t>.</a:t>
             </a:r>
             <a:endParaRPr lang="en-US" dirty="0"/>
@@ -5895,19 +6071,21 @@
           <p:cNvPr id="4" name="Title 1">
             <a:extLst>
               <a:ext uri="{FF2B5EF4-FFF2-40B4-BE49-F238E27FC236}">
-                <a16:creationId xmlns:a16="http://schemas.microsoft.com/office/drawing/2014/main" id="{DB574122-E7B9-4254-225F-A836DB41D354}"/>
+                <a16:creationId xmlns:a16="http://schemas.microsoft.com/office/drawing/2014/main" id="{FA629DDD-E946-F51C-061A-4BF914628C59}"/>
               </a:ext>
             </a:extLst>
           </p:cNvPr>
           <p:cNvSpPr txBox="1">
-            <a:spLocks/>
+            <a:spLocks noGrp="1"/>
           </p:cNvSpPr>
-          <p:nvPr/>
+          <p:nvPr>
+            <p:ph type="title"/>
+          </p:nvPr>
         </p:nvSpPr>
         <p:spPr>
           <a:xfrm>
-            <a:off x="857990" y="375410"/>
-            <a:ext cx="9590936" cy="906780"/>
+            <a:off x="1371600" y="685800"/>
+            <a:ext cx="9601200" cy="1043609"/>
           </a:xfrm>
           <a:prstGeom prst="rect">
             <a:avLst/>
@@ -5941,7 +6119,7 @@
               <a:rPr lang="en-US" b="1" u="sng" dirty="0">
                 <a:latin typeface="Cooper Black" panose="0208090404030B020404" pitchFamily="18" charset="77"/>
               </a:rPr>
-              <a:t>Analysis of Models for 7.5 seconds</a:t>
+              <a:t>Analysis of Models for 7.5 second</a:t>
             </a:r>
             <a:endParaRPr lang="en-IL" b="1" u="sng" dirty="0">
               <a:latin typeface="Cooper Black" panose="0208090404030B020404" pitchFamily="18" charset="77"/>
@@ -5951,10 +6129,10 @@
       </p:sp>
       <p:graphicFrame>
         <p:nvGraphicFramePr>
-          <p:cNvPr id="6" name="Table 5">
+          <p:cNvPr id="5" name="Table 4">
             <a:extLst>
               <a:ext uri="{FF2B5EF4-FFF2-40B4-BE49-F238E27FC236}">
-                <a16:creationId xmlns:a16="http://schemas.microsoft.com/office/drawing/2014/main" id="{BAE55557-BC2B-3459-107F-9184233CBD91}"/>
+                <a16:creationId xmlns:a16="http://schemas.microsoft.com/office/drawing/2014/main" id="{2F66045B-D4AD-95F3-20DD-03A4687CD096}"/>
               </a:ext>
             </a:extLst>
           </p:cNvPr>
@@ -5964,14 +6142,14 @@
           <p:nvPr>
             <p:extLst>
               <p:ext uri="{D42A27DB-BD31-4B8C-83A1-F6EECF244321}">
-                <p14:modId xmlns:p14="http://schemas.microsoft.com/office/powerpoint/2010/main" val="3292324111"/>
+                <p14:modId xmlns:p14="http://schemas.microsoft.com/office/powerpoint/2010/main" val="3672138936"/>
               </p:ext>
             </p:extLst>
           </p:nvPr>
         </p:nvGraphicFramePr>
         <p:xfrm>
-          <a:off x="1719470" y="2012297"/>
-          <a:ext cx="6514768" cy="1690296"/>
+          <a:off x="2811118" y="2259271"/>
+          <a:ext cx="6569764" cy="2708792"/>
         </p:xfrm>
         <a:graphic>
           <a:graphicData uri="http://schemas.openxmlformats.org/drawingml/2006/table">
@@ -5980,28 +6158,28 @@
                 <a:tableStyleId>{5C22544A-7EE6-4342-B048-85BDC9FD1C3A}</a:tableStyleId>
               </a:tblPr>
               <a:tblGrid>
-                <a:gridCol w="1628692">
+                <a:gridCol w="1642441">
                   <a:extLst>
                     <a:ext uri="{9D8B030D-6E8A-4147-A177-3AD203B41FA5}">
                       <a16:colId xmlns:a16="http://schemas.microsoft.com/office/drawing/2014/main" val="3803676094"/>
                     </a:ext>
                   </a:extLst>
                 </a:gridCol>
-                <a:gridCol w="1628692">
+                <a:gridCol w="1642441">
                   <a:extLst>
                     <a:ext uri="{9D8B030D-6E8A-4147-A177-3AD203B41FA5}">
                       <a16:colId xmlns:a16="http://schemas.microsoft.com/office/drawing/2014/main" val="3634636527"/>
                     </a:ext>
                   </a:extLst>
                 </a:gridCol>
-                <a:gridCol w="1628692">
+                <a:gridCol w="1642441">
                   <a:extLst>
                     <a:ext uri="{9D8B030D-6E8A-4147-A177-3AD203B41FA5}">
                       <a16:colId xmlns:a16="http://schemas.microsoft.com/office/drawing/2014/main" val="4074717009"/>
                     </a:ext>
                   </a:extLst>
                 </a:gridCol>
-                <a:gridCol w="1628692">
+                <a:gridCol w="1642441">
                   <a:extLst>
                     <a:ext uri="{9D8B030D-6E8A-4147-A177-3AD203B41FA5}">
                       <a16:colId xmlns:a16="http://schemas.microsoft.com/office/drawing/2014/main" val="4065931926"/>
@@ -6009,7 +6187,7 @@
                   </a:extLst>
                 </a:gridCol>
               </a:tblGrid>
-              <a:tr h="0">
+              <a:tr h="502356">
                 <a:tc>
                   <a:txBody>
                     <a:bodyPr/>
@@ -6069,7 +6247,7 @@
                   </a:ext>
                 </a:extLst>
               </a:tr>
-              <a:tr h="344206">
+              <a:tr h="551609">
                 <a:tc>
                   <a:txBody>
                     <a:bodyPr/>
@@ -6090,11 +6268,12 @@
                     <a:bodyPr/>
                     <a:lstStyle/>
                     <a:p>
-                      <a:pPr marL="0" algn="ctr" defTabSz="914400" rtl="0" eaLnBrk="1" latinLnBrk="0" hangingPunct="1"/>
-                      <a:r>
-                        <a:rPr lang="en-IL" sz="1600" dirty="0"/>
-                        <a:t>0.97</a:t>
-                      </a:r>
+                      <a:pPr marL="0" algn="ctr" defTabSz="914400" rtl="1" eaLnBrk="1" latinLnBrk="0" hangingPunct="1"/>
+                      <a:r>
+                        <a:rPr lang="en-US" sz="1600" dirty="0"/>
+                        <a:t>0.958</a:t>
+                      </a:r>
+                      <a:endParaRPr lang="en-IL" sz="1600" dirty="0"/>
                     </a:p>
                   </a:txBody>
                   <a:tcPr marL="84873" marR="84873" marT="42436" marB="42436" anchor="ctr"/>
@@ -6121,10 +6300,7 @@
                         <a:tabLst/>
                         <a:defRPr/>
                       </a:pPr>
-                      <a:r>
-                        <a:rPr lang="en-IL" sz="1600" dirty="0"/>
-                        <a:t>0.71</a:t>
-                      </a:r>
+                      <a:endParaRPr lang="en-IL" sz="1600" dirty="0"/>
                     </a:p>
                   </a:txBody>
                   <a:tcPr marL="82423" marR="82423" marT="41211" marB="41211" anchor="ctr"/>
@@ -6135,10 +6311,7 @@
                     <a:lstStyle/>
                     <a:p>
                       <a:pPr marL="0" algn="ctr" defTabSz="914400" rtl="0" eaLnBrk="1" latinLnBrk="0" hangingPunct="1"/>
-                      <a:r>
-                        <a:rPr lang="en-IL" sz="1600" dirty="0"/>
-                        <a:t>0.85</a:t>
-                      </a:r>
+                      <a:endParaRPr lang="en-IL" sz="1600" dirty="0"/>
                     </a:p>
                   </a:txBody>
                   <a:tcPr marL="80474" marR="80474" marT="40237" marB="40237" anchor="ctr"/>
@@ -6149,7 +6322,7 @@
                   </a:ext>
                 </a:extLst>
               </a:tr>
-              <a:tr h="344206">
+              <a:tr h="551609">
                 <a:tc>
                   <a:txBody>
                     <a:bodyPr/>
@@ -6173,7 +6346,7 @@
                       <a:pPr marL="0" algn="ctr" defTabSz="914400" rtl="0" eaLnBrk="1" latinLnBrk="0" hangingPunct="1"/>
                       <a:r>
                         <a:rPr lang="en-IL" sz="1600" dirty="0"/>
-                        <a:t>0.97</a:t>
+                        <a:t>0.96</a:t>
                       </a:r>
                     </a:p>
                   </a:txBody>
@@ -6185,10 +6358,7 @@
                     <a:lstStyle/>
                     <a:p>
                       <a:pPr marL="0" algn="ctr" defTabSz="914400" rtl="0" eaLnBrk="1" latinLnBrk="0" hangingPunct="1"/>
-                      <a:r>
-                        <a:rPr lang="en-IL" sz="1600" dirty="0"/>
-                        <a:t>0.81</a:t>
-                      </a:r>
+                      <a:endParaRPr lang="en-IL" sz="1600" dirty="0"/>
                     </a:p>
                   </a:txBody>
                   <a:tcPr marL="82423" marR="82423" marT="41211" marB="41211" anchor="ctr"/>
@@ -6199,10 +6369,7 @@
                     <a:lstStyle/>
                     <a:p>
                       <a:pPr marL="0" algn="ctr" defTabSz="914400" rtl="0" eaLnBrk="1" latinLnBrk="0" hangingPunct="1"/>
-                      <a:r>
-                        <a:rPr lang="en-IL" sz="1600" dirty="0"/>
-                        <a:t>0.86</a:t>
-                      </a:r>
+                      <a:endParaRPr lang="en-IL" sz="1600" dirty="0"/>
                     </a:p>
                   </a:txBody>
                   <a:tcPr marL="80474" marR="80474" marT="40237" marB="40237" anchor="ctr"/>
@@ -6213,7 +6380,7 @@
                   </a:ext>
                 </a:extLst>
               </a:tr>
-              <a:tr h="344206">
+              <a:tr h="551609">
                 <a:tc>
                   <a:txBody>
                     <a:bodyPr/>
@@ -6237,7 +6404,7 @@
                       <a:pPr algn="ctr"/>
                       <a:r>
                         <a:rPr lang="en-IL" sz="1600" dirty="0"/>
-                        <a:t>0.97</a:t>
+                        <a:t>0.96</a:t>
                       </a:r>
                     </a:p>
                   </a:txBody>
@@ -6249,10 +6416,7 @@
                     <a:lstStyle/>
                     <a:p>
                       <a:pPr algn="ctr"/>
-                      <a:r>
-                        <a:rPr lang="en-IL" sz="1600" dirty="0"/>
-                        <a:t> 0.71</a:t>
-                      </a:r>
+                      <a:endParaRPr lang="en-IL" sz="1600" dirty="0"/>
                     </a:p>
                   </a:txBody>
                   <a:tcPr marL="82423" marR="82423" marT="41211" marB="41211" anchor="ctr"/>
@@ -6263,10 +6427,7 @@
                     <a:lstStyle/>
                     <a:p>
                       <a:pPr algn="ctr"/>
-                      <a:r>
-                        <a:rPr lang="en-IL" sz="1600" dirty="0"/>
-                        <a:t>0.85</a:t>
-                      </a:r>
+                      <a:endParaRPr lang="en-IL" sz="1600" dirty="0"/>
                     </a:p>
                   </a:txBody>
                   <a:tcPr marL="80474" marR="80474" marT="40237" marB="40237" anchor="ctr"/>
@@ -6277,7 +6438,7 @@
                   </a:ext>
                 </a:extLst>
               </a:tr>
-              <a:tr h="344206">
+              <a:tr h="551609">
                 <a:tc>
                   <a:txBody>
                     <a:bodyPr/>
@@ -6301,7 +6462,7 @@
                       <a:pPr algn="ctr"/>
                       <a:r>
                         <a:rPr lang="en-IL" sz="1600" dirty="0"/>
-                        <a:t>0.97</a:t>
+                        <a:t>0.96</a:t>
                       </a:r>
                     </a:p>
                   </a:txBody>
@@ -6313,10 +6474,7 @@
                     <a:lstStyle/>
                     <a:p>
                       <a:pPr algn="ctr"/>
-                      <a:r>
-                        <a:rPr lang="en-IL" sz="1600" dirty="0"/>
-                        <a:t>0.69</a:t>
-                      </a:r>
+                      <a:endParaRPr lang="en-IL" sz="1600" dirty="0"/>
                     </a:p>
                   </a:txBody>
                   <a:tcPr marL="82423" marR="82423" marT="41211" marB="41211" anchor="ctr"/>
@@ -6327,10 +6485,7 @@
                     <a:lstStyle/>
                     <a:p>
                       <a:pPr algn="ctr"/>
-                      <a:r>
-                        <a:rPr lang="en-IL" sz="1600" dirty="0"/>
-                        <a:t>0.85</a:t>
-                      </a:r>
+                      <a:endParaRPr lang="en-IL" sz="1600" dirty="0"/>
                     </a:p>
                   </a:txBody>
                   <a:tcPr marL="80474" marR="80474" marT="40237" marB="40237" anchor="ctr"/>
@@ -6345,10 +6500,59 @@
           </a:graphicData>
         </a:graphic>
       </p:graphicFrame>
+      <p:sp>
+        <p:nvSpPr>
+          <p:cNvPr id="6" name="TextBox 5">
+            <a:extLst>
+              <a:ext uri="{FF2B5EF4-FFF2-40B4-BE49-F238E27FC236}">
+                <a16:creationId xmlns:a16="http://schemas.microsoft.com/office/drawing/2014/main" id="{75465842-A37A-05AB-D1D3-99485D88456A}"/>
+              </a:ext>
+            </a:extLst>
+          </p:cNvPr>
+          <p:cNvSpPr txBox="1"/>
+          <p:nvPr/>
+        </p:nvSpPr>
+        <p:spPr>
+          <a:xfrm>
+            <a:off x="397565" y="1520606"/>
+            <a:ext cx="11501955" cy="369332"/>
+          </a:xfrm>
+          <a:prstGeom prst="rect">
+            <a:avLst/>
+          </a:prstGeom>
+          <a:noFill/>
+        </p:spPr>
+        <p:txBody>
+          <a:bodyPr wrap="square" rtlCol="0">
+            <a:spAutoFit/>
+          </a:bodyPr>
+          <a:lstStyle/>
+          <a:p>
+            <a:pPr marL="0" algn="r" defTabSz="457200" rtl="1" eaLnBrk="1" latinLnBrk="0" hangingPunct="1"/>
+            <a:r>
+              <a:rPr lang="he-IL" dirty="0"/>
+              <a:t>ביצענו סינון ל-</a:t>
+            </a:r>
+            <a:r>
+              <a:rPr lang="en-US" dirty="0"/>
+              <a:t>sessions</a:t>
+            </a:r>
+            <a:r>
+              <a:rPr lang="he-IL" dirty="0"/>
+              <a:t> עם לפחות 100 פאקטות ובאורך לפחות 15 שניות (נשארו רק המחלקות</a:t>
+            </a:r>
+            <a:r>
+              <a:rPr lang="en-US" dirty="0"/>
+              <a:t>.(Google Doc, Google Drive, YouTube </a:t>
+            </a:r>
+            <a:endParaRPr lang="en-IL" dirty="0"/>
+          </a:p>
+        </p:txBody>
+      </p:sp>
     </p:spTree>
     <p:extLst>
       <p:ext uri="{BB962C8B-B14F-4D97-AF65-F5344CB8AC3E}">
-        <p14:creationId xmlns:p14="http://schemas.microsoft.com/office/powerpoint/2010/main" val="3552614521"/>
+        <p14:creationId xmlns:p14="http://schemas.microsoft.com/office/powerpoint/2010/main" val="1002818929"/>
       </p:ext>
     </p:extLst>
   </p:cSld>
@@ -18844,12 +19048,6 @@
 </file>
 
 <file path=customXml/item1.xml><?xml version="1.0" encoding="utf-8"?>
-<p:properties xmlns:p="http://schemas.microsoft.com/office/2006/metadata/properties" xmlns:xsi="http://www.w3.org/2001/XMLSchema-instance" xmlns:pc="http://schemas.microsoft.com/office/infopath/2007/PartnerControls">
-  <documentManagement/>
-</p:properties>
-</file>
-
-<file path=customXml/item2.xml><?xml version="1.0" encoding="utf-8"?>
 <?mso-contentType ?>
 <FormTemplates xmlns="http://schemas.microsoft.com/sharepoint/v3/contenttype/forms">
   <Display>DocumentLibraryForm</Display>
@@ -18858,7 +19056,7 @@
 </FormTemplates>
 </file>
 
-<file path=customXml/item3.xml><?xml version="1.0" encoding="utf-8"?>
+<file path=customXml/item2.xml><?xml version="1.0" encoding="utf-8"?>
 <ct:contentTypeSchema xmlns:ct="http://schemas.microsoft.com/office/2006/metadata/contentType" xmlns:ma="http://schemas.microsoft.com/office/2006/metadata/properties/metaAttributes" ct:_="" ma:_="" ma:contentTypeName="Document" ma:contentTypeID="0x010100EEF4C683CD165B4992F9150930098A29" ma:contentTypeVersion="4" ma:contentTypeDescription="Create a new document." ma:contentTypeScope="" ma:versionID="b8eb3d1345afeef1ad11e5227a5e9253">
   <xsd:schema xmlns:xsd="http://www.w3.org/2001/XMLSchema" xmlns:xs="http://www.w3.org/2001/XMLSchema" xmlns:p="http://schemas.microsoft.com/office/2006/metadata/properties" xmlns:ns3="f332a15c-2d41-4d22-9d6f-7615f0662225" targetNamespace="http://schemas.microsoft.com/office/2006/metadata/properties" ma:root="true" ma:fieldsID="4832e9e9ae5c1814893a1ae0f53476be" ns3:_="">
     <xsd:import namespace="f332a15c-2d41-4d22-9d6f-7615f0662225"/>
@@ -19002,23 +19200,13 @@
 </ct:contentTypeSchema>
 </file>
 
-<file path=customXml/itemProps1.xml><?xml version="1.0" encoding="utf-8"?>
-<ds:datastoreItem xmlns:ds="http://schemas.openxmlformats.org/officeDocument/2006/customXml" ds:itemID="{ED0AB103-65EA-4E44-9341-2974828BC112}">
-  <ds:schemaRefs>
-    <ds:schemaRef ds:uri="http://purl.org/dc/terms/"/>
-    <ds:schemaRef ds:uri="http://www.w3.org/XML/1998/namespace"/>
-    <ds:schemaRef ds:uri="http://schemas.microsoft.com/office/2006/documentManagement/types"/>
-    <ds:schemaRef ds:uri="http://purl.org/dc/elements/1.1/"/>
-    <ds:schemaRef ds:uri="http://schemas.openxmlformats.org/package/2006/metadata/core-properties"/>
-    <ds:schemaRef ds:uri="http://schemas.microsoft.com/office/infopath/2007/PartnerControls"/>
-    <ds:schemaRef ds:uri="f332a15c-2d41-4d22-9d6f-7615f0662225"/>
-    <ds:schemaRef ds:uri="http://schemas.microsoft.com/office/2006/metadata/properties"/>
-    <ds:schemaRef ds:uri="http://purl.org/dc/dcmitype/"/>
-  </ds:schemaRefs>
-</ds:datastoreItem>
+<file path=customXml/item3.xml><?xml version="1.0" encoding="utf-8"?>
+<p:properties xmlns:p="http://schemas.microsoft.com/office/2006/metadata/properties" xmlns:xsi="http://www.w3.org/2001/XMLSchema-instance" xmlns:pc="http://schemas.microsoft.com/office/infopath/2007/PartnerControls">
+  <documentManagement/>
+</p:properties>
 </file>
 
-<file path=customXml/itemProps2.xml><?xml version="1.0" encoding="utf-8"?>
+<file path=customXml/itemProps1.xml><?xml version="1.0" encoding="utf-8"?>
 <ds:datastoreItem xmlns:ds="http://schemas.openxmlformats.org/officeDocument/2006/customXml" ds:itemID="{D711FC6C-57B8-4DDF-A05B-D97AA9710A46}">
   <ds:schemaRefs>
     <ds:schemaRef ds:uri="http://schemas.microsoft.com/sharepoint/v3/contenttype/forms"/>
@@ -19026,7 +19214,7 @@
 </ds:datastoreItem>
 </file>
 
-<file path=customXml/itemProps3.xml><?xml version="1.0" encoding="utf-8"?>
+<file path=customXml/itemProps2.xml><?xml version="1.0" encoding="utf-8"?>
 <ds:datastoreItem xmlns:ds="http://schemas.openxmlformats.org/officeDocument/2006/customXml" ds:itemID="{D00F3B63-3FFB-499F-8F53-CF1B9BD093D5}">
   <ds:schemaRefs>
     <ds:schemaRef ds:uri="http://schemas.microsoft.com/office/2006/metadata/contentType"/>
@@ -19042,4 +19230,20 @@
     <ds:schemaRef ds:uri="http://schemas.microsoft.com/internal/obd"/>
   </ds:schemaRefs>
 </ds:datastoreItem>
+</file>
+
+<file path=customXml/itemProps3.xml><?xml version="1.0" encoding="utf-8"?>
+<ds:datastoreItem xmlns:ds="http://schemas.openxmlformats.org/officeDocument/2006/customXml" ds:itemID="{ED0AB103-65EA-4E44-9341-2974828BC112}">
+  <ds:schemaRefs>
+    <ds:schemaRef ds:uri="http://purl.org/dc/terms/"/>
+    <ds:schemaRef ds:uri="http://www.w3.org/XML/1998/namespace"/>
+    <ds:schemaRef ds:uri="http://schemas.microsoft.com/office/2006/documentManagement/types"/>
+    <ds:schemaRef ds:uri="http://purl.org/dc/elements/1.1/"/>
+    <ds:schemaRef ds:uri="http://schemas.openxmlformats.org/package/2006/metadata/core-properties"/>
+    <ds:schemaRef ds:uri="http://schemas.microsoft.com/office/infopath/2007/PartnerControls"/>
+    <ds:schemaRef ds:uri="f332a15c-2d41-4d22-9d6f-7615f0662225"/>
+    <ds:schemaRef ds:uri="http://schemas.microsoft.com/office/2006/metadata/properties"/>
+    <ds:schemaRef ds:uri="http://purl.org/dc/dcmitype/"/>
+  </ds:schemaRefs>
+</ds:datastoreItem>
 </file>
</xml_diff>

<commit_message>
Uploaduing CR link + presentation
</commit_message>
<xml_diff>
--- a/Research/Research_Progress.pptx
+++ b/Research/Research_Progress.pptx
@@ -6142,7 +6142,7 @@
           <p:nvPr>
             <p:extLst>
               <p:ext uri="{D42A27DB-BD31-4B8C-83A1-F6EECF244321}">
-                <p14:modId xmlns:p14="http://schemas.microsoft.com/office/powerpoint/2010/main" val="3672138936"/>
+                <p14:modId xmlns:p14="http://schemas.microsoft.com/office/powerpoint/2010/main" val="3882798137"/>
               </p:ext>
             </p:extLst>
           </p:nvPr>
@@ -6300,6 +6300,10 @@
                         <a:tabLst/>
                         <a:defRPr/>
                       </a:pPr>
+                      <a:r>
+                        <a:rPr lang="en-IL" sz="1600"/>
+                        <a:t>0.903</a:t>
+                      </a:r>
                       <a:endParaRPr lang="en-IL" sz="1600" dirty="0"/>
                     </a:p>
                   </a:txBody>
@@ -6358,7 +6362,10 @@
                     <a:lstStyle/>
                     <a:p>
                       <a:pPr marL="0" algn="ctr" defTabSz="914400" rtl="0" eaLnBrk="1" latinLnBrk="0" hangingPunct="1"/>
-                      <a:endParaRPr lang="en-IL" sz="1600" dirty="0"/>
+                      <a:r>
+                        <a:rPr lang="en-IL" sz="1600" dirty="0"/>
+                        <a:t>0.90</a:t>
+                      </a:r>
                     </a:p>
                   </a:txBody>
                   <a:tcPr marL="82423" marR="82423" marT="41211" marB="41211" anchor="ctr"/>
@@ -6416,7 +6423,10 @@
                     <a:lstStyle/>
                     <a:p>
                       <a:pPr algn="ctr"/>
-                      <a:endParaRPr lang="en-IL" sz="1600" dirty="0"/>
+                      <a:r>
+                        <a:rPr lang="en-IL" sz="1600" dirty="0"/>
+                        <a:t>0.90</a:t>
+                      </a:r>
                     </a:p>
                   </a:txBody>
                   <a:tcPr marL="82423" marR="82423" marT="41211" marB="41211" anchor="ctr"/>
@@ -6474,7 +6484,10 @@
                     <a:lstStyle/>
                     <a:p>
                       <a:pPr algn="ctr"/>
-                      <a:endParaRPr lang="en-IL" sz="1600" dirty="0"/>
+                      <a:r>
+                        <a:rPr lang="en-IL" sz="1600" dirty="0"/>
+                        <a:t>0.90</a:t>
+                      </a:r>
                     </a:p>
                   </a:txBody>
                   <a:tcPr marL="82423" marR="82423" marT="41211" marB="41211" anchor="ctr"/>
@@ -19057,6 +19070,12 @@
 </file>
 
 <file path=customXml/item2.xml><?xml version="1.0" encoding="utf-8"?>
+<p:properties xmlns:p="http://schemas.microsoft.com/office/2006/metadata/properties" xmlns:xsi="http://www.w3.org/2001/XMLSchema-instance" xmlns:pc="http://schemas.microsoft.com/office/infopath/2007/PartnerControls">
+  <documentManagement/>
+</p:properties>
+</file>
+
+<file path=customXml/item3.xml><?xml version="1.0" encoding="utf-8"?>
 <ct:contentTypeSchema xmlns:ct="http://schemas.microsoft.com/office/2006/metadata/contentType" xmlns:ma="http://schemas.microsoft.com/office/2006/metadata/properties/metaAttributes" ct:_="" ma:_="" ma:contentTypeName="Document" ma:contentTypeID="0x010100EEF4C683CD165B4992F9150930098A29" ma:contentTypeVersion="4" ma:contentTypeDescription="Create a new document." ma:contentTypeScope="" ma:versionID="b8eb3d1345afeef1ad11e5227a5e9253">
   <xsd:schema xmlns:xsd="http://www.w3.org/2001/XMLSchema" xmlns:xs="http://www.w3.org/2001/XMLSchema" xmlns:p="http://schemas.microsoft.com/office/2006/metadata/properties" xmlns:ns3="f332a15c-2d41-4d22-9d6f-7615f0662225" targetNamespace="http://schemas.microsoft.com/office/2006/metadata/properties" ma:root="true" ma:fieldsID="4832e9e9ae5c1814893a1ae0f53476be" ns3:_="">
     <xsd:import namespace="f332a15c-2d41-4d22-9d6f-7615f0662225"/>
@@ -19200,12 +19219,6 @@
 </ct:contentTypeSchema>
 </file>
 
-<file path=customXml/item3.xml><?xml version="1.0" encoding="utf-8"?>
-<p:properties xmlns:p="http://schemas.microsoft.com/office/2006/metadata/properties" xmlns:xsi="http://www.w3.org/2001/XMLSchema-instance" xmlns:pc="http://schemas.microsoft.com/office/infopath/2007/PartnerControls">
-  <documentManagement/>
-</p:properties>
-</file>
-
 <file path=customXml/itemProps1.xml><?xml version="1.0" encoding="utf-8"?>
 <ds:datastoreItem xmlns:ds="http://schemas.openxmlformats.org/officeDocument/2006/customXml" ds:itemID="{D711FC6C-57B8-4DDF-A05B-D97AA9710A46}">
   <ds:schemaRefs>
@@ -19215,6 +19228,22 @@
 </file>
 
 <file path=customXml/itemProps2.xml><?xml version="1.0" encoding="utf-8"?>
+<ds:datastoreItem xmlns:ds="http://schemas.openxmlformats.org/officeDocument/2006/customXml" ds:itemID="{ED0AB103-65EA-4E44-9341-2974828BC112}">
+  <ds:schemaRefs>
+    <ds:schemaRef ds:uri="http://purl.org/dc/terms/"/>
+    <ds:schemaRef ds:uri="http://www.w3.org/XML/1998/namespace"/>
+    <ds:schemaRef ds:uri="http://schemas.microsoft.com/office/2006/documentManagement/types"/>
+    <ds:schemaRef ds:uri="http://purl.org/dc/elements/1.1/"/>
+    <ds:schemaRef ds:uri="http://schemas.openxmlformats.org/package/2006/metadata/core-properties"/>
+    <ds:schemaRef ds:uri="http://schemas.microsoft.com/office/infopath/2007/PartnerControls"/>
+    <ds:schemaRef ds:uri="f332a15c-2d41-4d22-9d6f-7615f0662225"/>
+    <ds:schemaRef ds:uri="http://schemas.microsoft.com/office/2006/metadata/properties"/>
+    <ds:schemaRef ds:uri="http://purl.org/dc/dcmitype/"/>
+  </ds:schemaRefs>
+</ds:datastoreItem>
+</file>
+
+<file path=customXml/itemProps3.xml><?xml version="1.0" encoding="utf-8"?>
 <ds:datastoreItem xmlns:ds="http://schemas.openxmlformats.org/officeDocument/2006/customXml" ds:itemID="{D00F3B63-3FFB-499F-8F53-CF1B9BD093D5}">
   <ds:schemaRefs>
     <ds:schemaRef ds:uri="http://schemas.microsoft.com/office/2006/metadata/contentType"/>
@@ -19230,20 +19259,4 @@
     <ds:schemaRef ds:uri="http://schemas.microsoft.com/internal/obd"/>
   </ds:schemaRefs>
 </ds:datastoreItem>
-</file>
-
-<file path=customXml/itemProps3.xml><?xml version="1.0" encoding="utf-8"?>
-<ds:datastoreItem xmlns:ds="http://schemas.openxmlformats.org/officeDocument/2006/customXml" ds:itemID="{ED0AB103-65EA-4E44-9341-2974828BC112}">
-  <ds:schemaRefs>
-    <ds:schemaRef ds:uri="http://purl.org/dc/terms/"/>
-    <ds:schemaRef ds:uri="http://www.w3.org/XML/1998/namespace"/>
-    <ds:schemaRef ds:uri="http://schemas.microsoft.com/office/2006/documentManagement/types"/>
-    <ds:schemaRef ds:uri="http://purl.org/dc/elements/1.1/"/>
-    <ds:schemaRef ds:uri="http://schemas.openxmlformats.org/package/2006/metadata/core-properties"/>
-    <ds:schemaRef ds:uri="http://schemas.microsoft.com/office/infopath/2007/PartnerControls"/>
-    <ds:schemaRef ds:uri="f332a15c-2d41-4d22-9d6f-7615f0662225"/>
-    <ds:schemaRef ds:uri="http://schemas.microsoft.com/office/2006/metadata/properties"/>
-    <ds:schemaRef ds:uri="http://purl.org/dc/dcmitype/"/>
-  </ds:schemaRefs>
-</ds:datastoreItem>
 </file>
</xml_diff>